<commit_message>
report as it was handed in
</commit_message>
<xml_diff>
--- a/report/Figures/Architecture.pptx
+++ b/report/Figures/Architecture.pptx
@@ -104,6 +104,22 @@
       </a:defRPr>
     </a:lvl9pPr>
   </p:defaultTextStyle>
+  <p:extLst>
+    <p:ext uri="{EFAFB233-063F-42B5-8137-9DF3F51BA10A}">
+      <p15:sldGuideLst xmlns:p15="http://schemas.microsoft.com/office/powerpoint/2012/main">
+        <p15:guide id="1" orient="horz" pos="2160">
+          <p15:clr>
+            <a:srgbClr val="A4A3A4"/>
+          </p15:clr>
+        </p15:guide>
+        <p15:guide id="2" pos="2880">
+          <p15:clr>
+            <a:srgbClr val="A4A3A4"/>
+          </p15:clr>
+        </p15:guide>
+      </p15:sldGuideLst>
+    </p:ext>
+  </p:extLst>
 </p:presentation>
 </file>
 
@@ -288,7 +304,7 @@
           <a:p>
             <a:fld id="{FF278A1A-375A-47D5-9231-14647E8EF768}" type="datetimeFigureOut">
               <a:rPr lang="en-GB" smtClean="0"/>
-              <a:t>15/04/2014</a:t>
+              <a:t>16/04/2014</a:t>
             </a:fld>
             <a:endParaRPr lang="en-GB"/>
           </a:p>
@@ -458,7 +474,7 @@
           <a:p>
             <a:fld id="{FF278A1A-375A-47D5-9231-14647E8EF768}" type="datetimeFigureOut">
               <a:rPr lang="en-GB" smtClean="0"/>
-              <a:t>15/04/2014</a:t>
+              <a:t>16/04/2014</a:t>
             </a:fld>
             <a:endParaRPr lang="en-GB"/>
           </a:p>
@@ -638,7 +654,7 @@
           <a:p>
             <a:fld id="{FF278A1A-375A-47D5-9231-14647E8EF768}" type="datetimeFigureOut">
               <a:rPr lang="en-GB" smtClean="0"/>
-              <a:t>15/04/2014</a:t>
+              <a:t>16/04/2014</a:t>
             </a:fld>
             <a:endParaRPr lang="en-GB"/>
           </a:p>
@@ -808,7 +824,7 @@
           <a:p>
             <a:fld id="{FF278A1A-375A-47D5-9231-14647E8EF768}" type="datetimeFigureOut">
               <a:rPr lang="en-GB" smtClean="0"/>
-              <a:t>15/04/2014</a:t>
+              <a:t>16/04/2014</a:t>
             </a:fld>
             <a:endParaRPr lang="en-GB"/>
           </a:p>
@@ -1054,7 +1070,7 @@
           <a:p>
             <a:fld id="{FF278A1A-375A-47D5-9231-14647E8EF768}" type="datetimeFigureOut">
               <a:rPr lang="en-GB" smtClean="0"/>
-              <a:t>15/04/2014</a:t>
+              <a:t>16/04/2014</a:t>
             </a:fld>
             <a:endParaRPr lang="en-GB"/>
           </a:p>
@@ -1342,7 +1358,7 @@
           <a:p>
             <a:fld id="{FF278A1A-375A-47D5-9231-14647E8EF768}" type="datetimeFigureOut">
               <a:rPr lang="en-GB" smtClean="0"/>
-              <a:t>15/04/2014</a:t>
+              <a:t>16/04/2014</a:t>
             </a:fld>
             <a:endParaRPr lang="en-GB"/>
           </a:p>
@@ -1764,7 +1780,7 @@
           <a:p>
             <a:fld id="{FF278A1A-375A-47D5-9231-14647E8EF768}" type="datetimeFigureOut">
               <a:rPr lang="en-GB" smtClean="0"/>
-              <a:t>15/04/2014</a:t>
+              <a:t>16/04/2014</a:t>
             </a:fld>
             <a:endParaRPr lang="en-GB"/>
           </a:p>
@@ -1882,7 +1898,7 @@
           <a:p>
             <a:fld id="{FF278A1A-375A-47D5-9231-14647E8EF768}" type="datetimeFigureOut">
               <a:rPr lang="en-GB" smtClean="0"/>
-              <a:t>15/04/2014</a:t>
+              <a:t>16/04/2014</a:t>
             </a:fld>
             <a:endParaRPr lang="en-GB"/>
           </a:p>
@@ -1977,7 +1993,7 @@
           <a:p>
             <a:fld id="{FF278A1A-375A-47D5-9231-14647E8EF768}" type="datetimeFigureOut">
               <a:rPr lang="en-GB" smtClean="0"/>
-              <a:t>15/04/2014</a:t>
+              <a:t>16/04/2014</a:t>
             </a:fld>
             <a:endParaRPr lang="en-GB"/>
           </a:p>
@@ -2254,7 +2270,7 @@
           <a:p>
             <a:fld id="{FF278A1A-375A-47D5-9231-14647E8EF768}" type="datetimeFigureOut">
               <a:rPr lang="en-GB" smtClean="0"/>
-              <a:t>15/04/2014</a:t>
+              <a:t>16/04/2014</a:t>
             </a:fld>
             <a:endParaRPr lang="en-GB"/>
           </a:p>
@@ -2507,7 +2523,7 @@
           <a:p>
             <a:fld id="{FF278A1A-375A-47D5-9231-14647E8EF768}" type="datetimeFigureOut">
               <a:rPr lang="en-GB" smtClean="0"/>
-              <a:t>15/04/2014</a:t>
+              <a:t>16/04/2014</a:t>
             </a:fld>
             <a:endParaRPr lang="en-GB"/>
           </a:p>
@@ -2720,7 +2736,7 @@
           <a:p>
             <a:fld id="{FF278A1A-375A-47D5-9231-14647E8EF768}" type="datetimeFigureOut">
               <a:rPr lang="en-GB" smtClean="0"/>
-              <a:t>15/04/2014</a:t>
+              <a:t>16/04/2014</a:t>
             </a:fld>
             <a:endParaRPr lang="en-GB"/>
           </a:p>
@@ -3590,8 +3606,9 @@
             <a:pPr algn="ctr"/>
             <a:r>
               <a:rPr lang="en-GB" sz="1200" dirty="0" smtClean="0"/>
-              <a:t>PC -&gt;QR</a:t>
-            </a:r>
+              <a:t>Pc2Fpga</a:t>
+            </a:r>
+            <a:endParaRPr lang="en-GB" sz="1200" dirty="0" smtClean="0"/>
           </a:p>
           <a:p>
             <a:pPr algn="ctr"/>
@@ -3721,8 +3738,9 @@
             <a:pPr algn="ctr"/>
             <a:r>
               <a:rPr lang="en-GB" sz="1200" dirty="0" smtClean="0"/>
-              <a:t>PC -&gt;QR</a:t>
-            </a:r>
+              <a:t>Pc2Fpga</a:t>
+            </a:r>
+            <a:endParaRPr lang="en-GB" sz="1200" dirty="0" smtClean="0"/>
           </a:p>
           <a:p>
             <a:pPr algn="ctr"/>
@@ -4030,20 +4048,19 @@
         <p:nvCxnSpPr>
           <p:cNvPr id="51" name="Elbow Connector 50"/>
           <p:cNvCxnSpPr>
-            <a:stCxn id="38" idx="2"/>
+            <a:stCxn id="38" idx="1"/>
             <a:endCxn id="35" idx="3"/>
           </p:cNvCxnSpPr>
           <p:nvPr/>
         </p:nvCxnSpPr>
         <p:spPr>
-          <a:xfrm rot="5400000" flipH="1">
-            <a:off x="6247523" y="896718"/>
-            <a:ext cx="1224136" cy="2760309"/>
-          </a:xfrm>
-          <a:prstGeom prst="bentConnector4">
+          <a:xfrm rot="10800000">
+            <a:off x="5479437" y="1664804"/>
+            <a:ext cx="2040229" cy="504056"/>
+          </a:xfrm>
+          <a:prstGeom prst="bentConnector3">
             <a:avLst>
-              <a:gd name="adj1" fmla="val -18674"/>
-              <a:gd name="adj2" fmla="val 63043"/>
+              <a:gd name="adj1" fmla="val 50000"/>
             </a:avLst>
           </a:prstGeom>
           <a:ln w="19050">
@@ -4105,20 +4122,19 @@
         <p:nvCxnSpPr>
           <p:cNvPr id="68" name="Elbow Connector 67"/>
           <p:cNvCxnSpPr>
-            <a:stCxn id="38" idx="2"/>
+            <a:stCxn id="38" idx="1"/>
             <a:endCxn id="36" idx="3"/>
           </p:cNvCxnSpPr>
           <p:nvPr/>
         </p:nvCxnSpPr>
         <p:spPr>
-          <a:xfrm rot="5400000" flipH="1">
-            <a:off x="6688068" y="1337264"/>
-            <a:ext cx="343045" cy="2760309"/>
-          </a:xfrm>
-          <a:prstGeom prst="bentConnector4">
+          <a:xfrm rot="10800000" flipV="1">
+            <a:off x="5479437" y="2168859"/>
+            <a:ext cx="2040229" cy="377035"/>
+          </a:xfrm>
+          <a:prstGeom prst="bentConnector3">
             <a:avLst>
-              <a:gd name="adj1" fmla="val -66638"/>
-              <a:gd name="adj2" fmla="val 63043"/>
+              <a:gd name="adj1" fmla="val 50000"/>
             </a:avLst>
           </a:prstGeom>
           <a:ln w="19050">
@@ -4343,8 +4359,9 @@
             <a:pPr algn="ctr"/>
             <a:r>
               <a:rPr lang="en-GB" sz="1200" dirty="0" smtClean="0"/>
-              <a:t>QR-&gt;PC</a:t>
-            </a:r>
+              <a:t>Fpga2Pc</a:t>
+            </a:r>
+            <a:endParaRPr lang="en-GB" sz="1200" dirty="0" smtClean="0"/>
           </a:p>
           <a:p>
             <a:pPr algn="ctr"/>
@@ -4472,8 +4489,9 @@
             <a:pPr algn="ctr"/>
             <a:r>
               <a:rPr lang="en-GB" sz="1200" dirty="0" smtClean="0"/>
-              <a:t>QR-&gt;PC</a:t>
-            </a:r>
+              <a:t>Fpga2Pc</a:t>
+            </a:r>
+            <a:endParaRPr lang="en-GB" sz="1200" dirty="0" smtClean="0"/>
           </a:p>
           <a:p>
             <a:pPr algn="ctr"/>
@@ -4739,7 +4757,7 @@
         </p:nvSpPr>
         <p:spPr>
           <a:xfrm>
-            <a:off x="7321887" y="3140968"/>
+            <a:off x="6523542" y="1794669"/>
             <a:ext cx="720080" cy="369332"/>
           </a:xfrm>
           <a:prstGeom prst="rect">
@@ -4948,6 +4966,290 @@
             <a:solidFill>
               <a:srgbClr val="FFC000"/>
             </a:solidFill>
+            <a:tailEnd type="arrow"/>
+          </a:ln>
+        </p:spPr>
+        <p:style>
+          <a:lnRef idx="1">
+            <a:schemeClr val="accent1"/>
+          </a:lnRef>
+          <a:fillRef idx="0">
+            <a:schemeClr val="accent1"/>
+          </a:fillRef>
+          <a:effectRef idx="0">
+            <a:schemeClr val="accent1"/>
+          </a:effectRef>
+          <a:fontRef idx="minor">
+            <a:schemeClr val="tx1"/>
+          </a:fontRef>
+        </p:style>
+      </p:cxnSp>
+      <p:sp>
+        <p:nvSpPr>
+          <p:cNvPr id="11" name="TextBox 10"/>
+          <p:cNvSpPr txBox="1"/>
+          <p:nvPr/>
+        </p:nvSpPr>
+        <p:spPr>
+          <a:xfrm>
+            <a:off x="1354552" y="2287784"/>
+            <a:ext cx="1215753" cy="307777"/>
+          </a:xfrm>
+          <a:prstGeom prst="rect">
+            <a:avLst/>
+          </a:prstGeom>
+          <a:noFill/>
+        </p:spPr>
+        <p:txBody>
+          <a:bodyPr wrap="square" rtlCol="0">
+            <a:spAutoFit/>
+          </a:bodyPr>
+          <a:lstStyle/>
+          <a:p>
+            <a:r>
+              <a:rPr lang="nl-NL" sz="1400" dirty="0" smtClean="0"/>
+              <a:t>115k2bps 8n1</a:t>
+            </a:r>
+            <a:endParaRPr lang="en-US" sz="1400" dirty="0"/>
+          </a:p>
+        </p:txBody>
+      </p:sp>
+      <p:sp>
+        <p:nvSpPr>
+          <p:cNvPr id="52" name="TextBox 51"/>
+          <p:cNvSpPr txBox="1"/>
+          <p:nvPr/>
+        </p:nvSpPr>
+        <p:spPr>
+          <a:xfrm>
+            <a:off x="3153949" y="5158602"/>
+            <a:ext cx="1215753" cy="307777"/>
+          </a:xfrm>
+          <a:prstGeom prst="rect">
+            <a:avLst/>
+          </a:prstGeom>
+          <a:noFill/>
+        </p:spPr>
+        <p:txBody>
+          <a:bodyPr wrap="square" rtlCol="0">
+            <a:spAutoFit/>
+          </a:bodyPr>
+          <a:lstStyle/>
+          <a:p>
+            <a:r>
+              <a:rPr lang="nl-NL" sz="1400" dirty="0" smtClean="0"/>
+              <a:t>115k2bps 8n1</a:t>
+            </a:r>
+            <a:endParaRPr lang="en-US" sz="1400" dirty="0"/>
+          </a:p>
+        </p:txBody>
+      </p:sp>
+      <p:sp>
+        <p:nvSpPr>
+          <p:cNvPr id="53" name="TextBox 52"/>
+          <p:cNvSpPr txBox="1"/>
+          <p:nvPr/>
+        </p:nvSpPr>
+        <p:spPr>
+          <a:xfrm>
+            <a:off x="5868144" y="562636"/>
+            <a:ext cx="1215753" cy="307777"/>
+          </a:xfrm>
+          <a:prstGeom prst="rect">
+            <a:avLst/>
+          </a:prstGeom>
+          <a:noFill/>
+        </p:spPr>
+        <p:txBody>
+          <a:bodyPr wrap="square" rtlCol="0">
+            <a:spAutoFit/>
+          </a:bodyPr>
+          <a:lstStyle/>
+          <a:p>
+            <a:r>
+              <a:rPr lang="nl-NL" sz="1400" dirty="0" smtClean="0"/>
+              <a:t>500kbps 8n1</a:t>
+            </a:r>
+            <a:endParaRPr lang="en-US" sz="1400" dirty="0"/>
+          </a:p>
+        </p:txBody>
+      </p:sp>
+      <p:sp>
+        <p:nvSpPr>
+          <p:cNvPr id="54" name="TextBox 53"/>
+          <p:cNvSpPr txBox="1"/>
+          <p:nvPr/>
+        </p:nvSpPr>
+        <p:spPr>
+          <a:xfrm>
+            <a:off x="6438062" y="2173717"/>
+            <a:ext cx="1215753" cy="307777"/>
+          </a:xfrm>
+          <a:prstGeom prst="rect">
+            <a:avLst/>
+          </a:prstGeom>
+          <a:noFill/>
+        </p:spPr>
+        <p:txBody>
+          <a:bodyPr wrap="square" rtlCol="0">
+            <a:spAutoFit/>
+          </a:bodyPr>
+          <a:lstStyle/>
+          <a:p>
+            <a:r>
+              <a:rPr lang="nl-NL" sz="1400" dirty="0" smtClean="0"/>
+              <a:t>500kbps 8n1</a:t>
+            </a:r>
+            <a:endParaRPr lang="en-US" sz="1400" dirty="0"/>
+          </a:p>
+        </p:txBody>
+      </p:sp>
+      <p:sp>
+        <p:nvSpPr>
+          <p:cNvPr id="58" name="Rectangle 57"/>
+          <p:cNvSpPr/>
+          <p:nvPr/>
+        </p:nvSpPr>
+        <p:spPr>
+          <a:xfrm>
+            <a:off x="7167357" y="3371447"/>
+            <a:ext cx="908484" cy="504056"/>
+          </a:xfrm>
+          <a:prstGeom prst="rect">
+            <a:avLst/>
+          </a:prstGeom>
+        </p:spPr>
+        <p:style>
+          <a:lnRef idx="2">
+            <a:schemeClr val="accent1">
+              <a:shade val="50000"/>
+            </a:schemeClr>
+          </a:lnRef>
+          <a:fillRef idx="1">
+            <a:schemeClr val="accent1"/>
+          </a:fillRef>
+          <a:effectRef idx="0">
+            <a:schemeClr val="accent1"/>
+          </a:effectRef>
+          <a:fontRef idx="minor">
+            <a:schemeClr val="lt1"/>
+          </a:fontRef>
+        </p:style>
+        <p:txBody>
+          <a:bodyPr rtlCol="0" anchor="ctr"/>
+          <a:lstStyle/>
+          <a:p>
+            <a:pPr algn="ctr"/>
+            <a:r>
+              <a:rPr lang="en-GB" sz="1200" dirty="0" smtClean="0"/>
+              <a:t>Gyro/</a:t>
+            </a:r>
+            <a:r>
+              <a:rPr lang="en-GB" sz="1200" dirty="0" err="1" smtClean="0"/>
+              <a:t>accel</a:t>
+            </a:r>
+            <a:r>
+              <a:rPr lang="en-GB" sz="1200" dirty="0" smtClean="0"/>
+              <a:t> (6)</a:t>
+            </a:r>
+            <a:endParaRPr lang="en-GB" sz="1200" dirty="0"/>
+          </a:p>
+        </p:txBody>
+      </p:sp>
+      <p:sp>
+        <p:nvSpPr>
+          <p:cNvPr id="59" name="Rectangle 58"/>
+          <p:cNvSpPr/>
+          <p:nvPr/>
+        </p:nvSpPr>
+        <p:spPr>
+          <a:xfrm>
+            <a:off x="8233493" y="3371447"/>
+            <a:ext cx="908484" cy="504056"/>
+          </a:xfrm>
+          <a:prstGeom prst="rect">
+            <a:avLst/>
+          </a:prstGeom>
+        </p:spPr>
+        <p:style>
+          <a:lnRef idx="2">
+            <a:schemeClr val="accent1">
+              <a:shade val="50000"/>
+            </a:schemeClr>
+          </a:lnRef>
+          <a:fillRef idx="1">
+            <a:schemeClr val="accent1"/>
+          </a:fillRef>
+          <a:effectRef idx="0">
+            <a:schemeClr val="accent1"/>
+          </a:effectRef>
+          <a:fontRef idx="minor">
+            <a:schemeClr val="lt1"/>
+          </a:fontRef>
+        </p:style>
+        <p:txBody>
+          <a:bodyPr rtlCol="0" anchor="ctr"/>
+          <a:lstStyle/>
+          <a:p>
+            <a:pPr algn="ctr"/>
+            <a:r>
+              <a:rPr lang="en-GB" sz="1200" dirty="0" smtClean="0"/>
+              <a:t>Engines (4)</a:t>
+            </a:r>
+            <a:endParaRPr lang="en-GB" sz="1200" dirty="0"/>
+          </a:p>
+        </p:txBody>
+      </p:sp>
+      <p:cxnSp>
+        <p:nvCxnSpPr>
+          <p:cNvPr id="66" name="Elbow Connector 65"/>
+          <p:cNvCxnSpPr/>
+          <p:nvPr/>
+        </p:nvCxnSpPr>
+        <p:spPr>
+          <a:xfrm rot="5400000" flipH="1" flipV="1">
+            <a:off x="7644669" y="3122929"/>
+            <a:ext cx="497037" cy="1"/>
+          </a:xfrm>
+          <a:prstGeom prst="bentConnector3">
+            <a:avLst/>
+          </a:prstGeom>
+          <a:ln w="19050">
+            <a:tailEnd type="arrow"/>
+          </a:ln>
+        </p:spPr>
+        <p:style>
+          <a:lnRef idx="1">
+            <a:schemeClr val="accent1"/>
+          </a:lnRef>
+          <a:fillRef idx="0">
+            <a:schemeClr val="accent1"/>
+          </a:fillRef>
+          <a:effectRef idx="0">
+            <a:schemeClr val="accent1"/>
+          </a:effectRef>
+          <a:fontRef idx="minor">
+            <a:schemeClr val="tx1"/>
+          </a:fontRef>
+        </p:style>
+      </p:cxnSp>
+      <p:cxnSp>
+        <p:nvCxnSpPr>
+          <p:cNvPr id="69" name="Elbow Connector 68"/>
+          <p:cNvCxnSpPr/>
+          <p:nvPr/>
+        </p:nvCxnSpPr>
+        <p:spPr>
+          <a:xfrm rot="16200000" flipH="1">
+            <a:off x="8137567" y="3020962"/>
+            <a:ext cx="700970" cy="1"/>
+          </a:xfrm>
+          <a:prstGeom prst="bentConnector3">
+            <a:avLst>
+              <a:gd name="adj1" fmla="val 50000"/>
+            </a:avLst>
+          </a:prstGeom>
+          <a:ln w="19050">
             <a:tailEnd type="arrow"/>
           </a:ln>
         </p:spPr>

</xml_diff>